<commit_message>
update lecture 18 notebook and ppt
</commit_message>
<xml_diff>
--- a/lecture/Lecture 18 October 23/18 resampling.pptx
+++ b/lecture/Lecture 18 October 23/18 resampling.pptx
@@ -3448,18 +3448,13 @@
           <a:p>
             <a:r>
               <a:rPr lang="en-US" dirty="0"/>
-              <a:t>Class </a:t>
-            </a:r>
-            <a:r>
-              <a:rPr lang="en-US"/>
-              <a:t># 7</a:t>
-            </a:r>
-            <a:endParaRPr lang="en-US" dirty="0"/>
-          </a:p>
-          <a:p>
-            <a:r>
-              <a:rPr lang="en-US" dirty="0"/>
-              <a:t>Sept 14 2017</a:t>
+              <a:t>Class # 18</a:t>
+            </a:r>
+          </a:p>
+          <a:p>
+            <a:r>
+              <a:rPr lang="en-US" dirty="0"/>
+              <a:t>October 23, 2018</a:t>
             </a:r>
           </a:p>
         </p:txBody>
@@ -5932,7 +5927,50 @@
           <a:bodyPr/>
           <a:lstStyle/>
           <a:p>
-            <a:endParaRPr lang="en-US"/>
+            <a:r>
+              <a:rPr lang="en-US" dirty="0"/>
+              <a:t>HW7 due today</a:t>
+            </a:r>
+          </a:p>
+          <a:p>
+            <a:r>
+              <a:rPr lang="en-US" dirty="0"/>
+              <a:t>HW8 will post today – </a:t>
+            </a:r>
+          </a:p>
+          <a:p>
+            <a:pPr lvl="1"/>
+            <a:r>
+              <a:rPr lang="en-US" dirty="0"/>
+              <a:t>there will be time to work on it in the next lab</a:t>
+            </a:r>
+          </a:p>
+          <a:p>
+            <a:pPr lvl="1"/>
+            <a:r>
+              <a:rPr lang="en-US" dirty="0"/>
+              <a:t>I’ll give you some hints today on how to do it.</a:t>
+            </a:r>
+          </a:p>
+          <a:p>
+            <a:r>
+              <a:rPr lang="en-US" dirty="0"/>
+              <a:t>Guest lectures / panels upcoming</a:t>
+            </a:r>
+          </a:p>
+          <a:p>
+            <a:pPr lvl="1"/>
+            <a:r>
+              <a:rPr lang="en-US" dirty="0"/>
+              <a:t>Nov 1</a:t>
+            </a:r>
+          </a:p>
+          <a:p>
+            <a:pPr lvl="1"/>
+            <a:r>
+              <a:rPr lang="en-US" dirty="0"/>
+              <a:t>Nov 15</a:t>
+            </a:r>
           </a:p>
         </p:txBody>
       </p:sp>

</xml_diff>